<commit_message>
Actualizar archivos DOCUMENTOS FASE1
</commit_message>
<xml_diff>
--- a/DOCUMENTOS FASE1/evidencias grupales/Presentación_Proyecto.pptx
+++ b/DOCUMENTOS FASE1/evidencias grupales/Presentación_Proyecto.pptx
@@ -10817,54 +10817,7 @@
                 <a:cs typeface="Montserrat"/>
                 <a:sym typeface="Montserrat"/>
               </a:rPr>
-              <a:t>HU17 (Alta): Como docente evaluador, quiero revisar la arquitectura y base de datos final para confirmar la correcta implementación del diseño.</a:t>
-            </a:r>
-            <a:br>
-              <a:rPr lang="es" sz="1100" dirty="0">
-                <a:solidFill>
-                  <a:schemeClr val="dk1"/>
-                </a:solidFill>
-                <a:latin typeface="Montserrat"/>
-                <a:ea typeface="Montserrat"/>
-                <a:cs typeface="Montserrat"/>
-                <a:sym typeface="Montserrat"/>
-              </a:rPr>
-            </a:br>
-            <a:endParaRPr sz="1100" dirty="0">
-              <a:solidFill>
-                <a:schemeClr val="dk1"/>
-              </a:solidFill>
-              <a:latin typeface="Montserrat"/>
-              <a:ea typeface="Montserrat"/>
-              <a:cs typeface="Montserrat"/>
-              <a:sym typeface="Montserrat"/>
-            </a:endParaRPr>
-          </a:p>
-          <a:p>
-            <a:pPr marL="457200" lvl="0" indent="-297894" rtl="0">
-              <a:spcBef>
-                <a:spcPts val="0"/>
-              </a:spcBef>
-              <a:spcAft>
-                <a:spcPts val="0"/>
-              </a:spcAft>
-              <a:buClr>
-                <a:schemeClr val="dk1"/>
-              </a:buClr>
-              <a:buSzPct val="100000"/>
-              <a:buChar char="●"/>
-            </a:pPr>
-            <a:r>
-              <a:rPr lang="es" sz="1100" dirty="0">
-                <a:solidFill>
-                  <a:schemeClr val="dk1"/>
-                </a:solidFill>
-                <a:latin typeface="Montserrat"/>
-                <a:ea typeface="Montserrat"/>
-                <a:cs typeface="Montserrat"/>
-                <a:sym typeface="Montserrat"/>
-              </a:rPr>
-              <a:t>HU18 (Media): Como docente evaluador, quiero revisar las evidencias de pruebas finales (sistema y aceptación) para confirmar la calidad y cumplimiento de los requerimientos.</a:t>
+              <a:t>HU17 (Media): Como docente evaluador, quiero revisar las evidencias de pruebas finales (sistema y aceptación) para confirmar la calidad y cumplimiento de los requerimientos.</a:t>
             </a:r>
             <a:endParaRPr sz="1100" dirty="0">
               <a:solidFill>

</xml_diff>